<commit_message>
An einem Strang ziehen pdf erneuert
</commit_message>
<xml_diff>
--- a/agile moves/Teamtool (TTO)/ger_TTO_01_An_einem_Strang_ziehen.pptx
+++ b/agile moves/Teamtool (TTO)/ger_TTO_01_An_einem_Strang_ziehen.pptx
@@ -107,7 +107,7 @@
   </p:defaultTextStyle>
   <p:extLst>
     <p:ext uri="{EFAFB233-063F-42B5-8137-9DF3F51BA10A}">
-      <p15:sldGuideLst xmlns:p15="http://schemas.microsoft.com/office/powerpoint/2012/main" xmlns="">
+      <p15:sldGuideLst xmlns="" xmlns:p15="http://schemas.microsoft.com/office/powerpoint/2012/main">
         <p15:guide id="1" orient="horz" pos="1103">
           <p15:clr>
             <a:srgbClr val="A4A3A4"/>
@@ -781,7 +781,7 @@
           <a:p>
             <a:fld id="{FF5B2BAF-DF38-0A48-A798-0C06E514FD52}" type="datetimeFigureOut">
               <a:rPr lang="de-DE" smtClean="0"/>
-              <a:t>05.06.15</a:t>
+              <a:t>12.06.15</a:t>
             </a:fld>
             <a:endParaRPr lang="de-DE" dirty="0"/>
           </a:p>
@@ -1004,7 +1004,7 @@
           <a:p>
             <a:fld id="{FF5B2BAF-DF38-0A48-A798-0C06E514FD52}" type="datetimeFigureOut">
               <a:rPr lang="de-DE" smtClean="0"/>
-              <a:t>05.06.15</a:t>
+              <a:t>12.06.15</a:t>
             </a:fld>
             <a:endParaRPr lang="de-DE" dirty="0"/>
           </a:p>

</xml_diff>